<commit_message>
Correções nos slides de administração
</commit_message>
<xml_diff>
--- a/slides/02_Administracao do Redis.pptx
+++ b/slides/02_Administracao do Redis.pptx
@@ -10327,15 +10327,7 @@
             </a:r>
             <a:r>
               <a:rPr lang="pt-BR" dirty="0" smtClean="0"/>
-              <a:t> na inicialização da instância para </a:t>
-            </a:r>
-            <a:r>
-              <a:rPr lang="pt-BR" dirty="0" smtClean="0"/>
-              <a:t>restaurar </a:t>
-            </a:r>
-            <a:r>
-              <a:rPr lang="pt-BR" dirty="0" smtClean="0"/>
-              <a:t>o estado anterior</a:t>
+              <a:t> na inicialização da instância para restaurar o estado anterior</a:t>
             </a:r>
             <a:endParaRPr lang="en-US" dirty="0"/>
           </a:p>
@@ -11485,11 +11477,7 @@
             </a:r>
             <a:r>
               <a:rPr lang="en-US" dirty="0" smtClean="0"/>
-              <a:t> </a:t>
-            </a:r>
-            <a:r>
-              <a:rPr lang="en-US" dirty="0" smtClean="0"/>
-              <a:t>o </a:t>
+              <a:t> o </a:t>
             </a:r>
             <a:r>
               <a:rPr lang="en-US" dirty="0" err="1" smtClean="0"/>
@@ -12177,7 +12165,19 @@
           <a:p>
             <a:r>
               <a:rPr lang="pt-BR" dirty="0" smtClean="0"/>
-              <a:t>Recomendação de parâmetros a serem monitorados</a:t>
+              <a:t>Recomendação de </a:t>
+            </a:r>
+            <a:r>
+              <a:rPr lang="pt-BR" dirty="0" smtClean="0"/>
+              <a:t>métricas a </a:t>
+            </a:r>
+            <a:r>
+              <a:rPr lang="pt-BR" dirty="0" smtClean="0"/>
+              <a:t>serem </a:t>
+            </a:r>
+            <a:r>
+              <a:rPr lang="pt-BR" dirty="0" smtClean="0"/>
+              <a:t>monitoradas</a:t>
             </a:r>
             <a:endParaRPr lang="en-US" dirty="0"/>
           </a:p>
@@ -13569,25 +13569,52 @@
               <a:t> </a:t>
             </a:r>
             <a:r>
-              <a:rPr lang="en-US" dirty="0" smtClean="0">
+              <a:rPr lang="en-US" dirty="0" err="1">
                 <a:latin typeface="Courier New" panose="02070309020205020404" pitchFamily="49" charset="0"/>
                 <a:cs typeface="Courier New" panose="02070309020205020404" pitchFamily="49" charset="0"/>
               </a:rPr>
-              <a:t>&lt;</a:t>
-            </a:r>
-            <a:r>
-              <a:rPr lang="en-US" dirty="0" err="1" smtClean="0">
+              <a:t>slowlog</a:t>
+            </a:r>
+            <a:r>
+              <a:rPr lang="en-US" dirty="0">
                 <a:latin typeface="Courier New" panose="02070309020205020404" pitchFamily="49" charset="0"/>
                 <a:cs typeface="Courier New" panose="02070309020205020404" pitchFamily="49" charset="0"/>
               </a:rPr>
-              <a:t>tam_maximo</a:t>
-            </a:r>
-            <a:r>
-              <a:rPr lang="en-US" dirty="0" smtClean="0">
+              <a:t>-max-</a:t>
+            </a:r>
+            <a:r>
+              <a:rPr lang="en-US" dirty="0" err="1">
                 <a:latin typeface="Courier New" panose="02070309020205020404" pitchFamily="49" charset="0"/>
                 <a:cs typeface="Courier New" panose="02070309020205020404" pitchFamily="49" charset="0"/>
               </a:rPr>
-              <a:t>&gt;</a:t>
+              <a:t>len</a:t>
+            </a:r>
+            <a:r>
+              <a:rPr lang="en-US" dirty="0">
+                <a:latin typeface="Courier New" panose="02070309020205020404" pitchFamily="49" charset="0"/>
+                <a:cs typeface="Courier New" panose="02070309020205020404" pitchFamily="49" charset="0"/>
+              </a:rPr>
+              <a:t> </a:t>
+            </a:r>
+            <a:r>
+              <a:rPr lang="en-US" dirty="0"/>
+              <a:t>(</a:t>
+            </a:r>
+            <a:r>
+              <a:rPr lang="en-US" dirty="0" err="1"/>
+              <a:t>configuração</a:t>
+            </a:r>
+            <a:r>
+              <a:rPr lang="en-US" dirty="0"/>
+              <a:t> </a:t>
+            </a:r>
+            <a:r>
+              <a:rPr lang="en-US" dirty="0" err="1"/>
+              <a:t>separada</a:t>
+            </a:r>
+            <a:r>
+              <a:rPr lang="en-US" dirty="0"/>
+              <a:t>)</a:t>
             </a:r>
           </a:p>
           <a:p>
@@ -13596,7 +13623,14 @@
                 <a:latin typeface="+mj-lt"/>
                 <a:cs typeface="Courier New" panose="02070309020205020404" pitchFamily="49" charset="0"/>
               </a:rPr>
-              <a:t>Comando para receber a lista de comandos lentos registrados:</a:t>
+              <a:t>Comando </a:t>
+            </a:r>
+            <a:r>
+              <a:rPr lang="pt-BR" dirty="0" smtClean="0">
+                <a:latin typeface="+mj-lt"/>
+                <a:cs typeface="Courier New" panose="02070309020205020404" pitchFamily="49" charset="0"/>
+              </a:rPr>
+              <a:t>para receber a lista de comandos lentos registrados:</a:t>
             </a:r>
             <a:endParaRPr lang="en-US" dirty="0" smtClean="0">
               <a:latin typeface="+mj-lt"/>
@@ -13826,27 +13860,7 @@
               <a:t>microssegundos</a:t>
             </a:r>
             <a:r>
-              <a:rPr lang="en-US" sz="1200" dirty="0" smtClean="0">
-                <a:solidFill>
-                  <a:schemeClr val="tx2"/>
-                </a:solidFill>
-                <a:latin typeface="Courier New" pitchFamily="49" charset="0"/>
-                <a:cs typeface="Courier New" pitchFamily="49" charset="0"/>
-              </a:rPr>
-              <a:t>&gt; &lt;</a:t>
-            </a:r>
-            <a:r>
-              <a:rPr lang="en-US" sz="1200" dirty="0" err="1" smtClean="0">
-                <a:solidFill>
-                  <a:schemeClr val="tx2"/>
-                </a:solidFill>
-                <a:latin typeface="Courier New" pitchFamily="49" charset="0"/>
-                <a:cs typeface="Courier New" pitchFamily="49" charset="0"/>
-              </a:rPr>
-              <a:t>tam_maximo</a:t>
-            </a:r>
-            <a:r>
-              <a:rPr lang="en-US" sz="1200" dirty="0" smtClean="0">
+              <a:rPr lang="en-US" sz="1200" dirty="0">
                 <a:solidFill>
                   <a:schemeClr val="tx2"/>
                 </a:solidFill>
@@ -20910,11 +20924,19 @@
             </a:r>
             <a:r>
               <a:rPr lang="en-US" dirty="0" smtClean="0"/>
-              <a:t> no </a:t>
+              <a:t> </a:t>
             </a:r>
             <a:r>
               <a:rPr lang="en-US" dirty="0" err="1" smtClean="0"/>
-              <a:t>documento</a:t>
+              <a:t>nos</a:t>
+            </a:r>
+            <a:r>
+              <a:rPr lang="en-US" dirty="0" smtClean="0"/>
+              <a:t> </a:t>
+            </a:r>
+            <a:r>
+              <a:rPr lang="en-US" dirty="0" err="1" smtClean="0"/>
+              <a:t>documentos</a:t>
             </a:r>
             <a:r>
               <a:rPr lang="en-US" dirty="0" smtClean="0"/>
@@ -20935,6 +20957,11 @@
               <a:rPr lang="pt-BR" dirty="0" smtClean="0"/>
               <a:t>Explorar </a:t>
             </a:r>
+            <a:r>
+              <a:rPr lang="pt-BR" dirty="0" smtClean="0"/>
+              <a:t>opções de monitoramento e logs</a:t>
+            </a:r>
+            <a:endParaRPr lang="pt-BR" dirty="0" smtClean="0"/>
           </a:p>
           <a:p>
             <a:pPr marL="285750" indent="-285750">
@@ -20943,7 +20970,11 @@
             </a:pPr>
             <a:r>
               <a:rPr lang="pt-BR" dirty="0" smtClean="0"/>
-              <a:t>Experimentar</a:t>
+              <a:t>Experimentar com carga massiva de dados e notificações de eventos e mudança </a:t>
+            </a:r>
+            <a:r>
+              <a:rPr lang="pt-BR" smtClean="0"/>
+              <a:t>de chaves</a:t>
             </a:r>
             <a:endParaRPr lang="en-US" dirty="0">
               <a:latin typeface="Courier New" panose="02070309020205020404" pitchFamily="49" charset="0"/>
@@ -22896,6 +22927,12 @@
 </file>
 
 <file path=customXml/item1.xml><?xml version="1.0" encoding="utf-8"?>
+<p:properties xmlns:p="http://schemas.microsoft.com/office/2006/metadata/properties" xmlns:xsi="http://www.w3.org/2001/XMLSchema-instance">
+  <documentManagement/>
+</p:properties>
+</file>
+
+<file path=customXml/item2.xml><?xml version="1.0" encoding="utf-8"?>
 <ct:contentTypeSchema xmlns:ct="http://schemas.microsoft.com/office/2006/metadata/contentType" xmlns:ma="http://schemas.microsoft.com/office/2006/metadata/properties/metaAttributes" ct:_="" ma:_="" ma:contentTypeName="Document" ma:contentTypeID="0x010100EAEEBEE83C66E54EA9BED83B0A9A60DB" ma:contentTypeVersion="1" ma:contentTypeDescription="Create a new document." ma:contentTypeScope="" ma:versionID="51a43b2161297f783d65b37e357c79e9">
   <xsd:schema xmlns:xsd="http://www.w3.org/2001/XMLSchema" xmlns:p="http://schemas.microsoft.com/office/2006/metadata/properties" targetNamespace="http://schemas.microsoft.com/office/2006/metadata/properties" ma:root="true" ma:fieldsID="b9cfef283e0bc2d986a66f9ec0cdc424">
     <xsd:element name="properties">
@@ -22944,12 +22981,6 @@
 </ct:contentTypeSchema>
 </file>
 
-<file path=customXml/item2.xml><?xml version="1.0" encoding="utf-8"?>
-<p:properties xmlns:p="http://schemas.microsoft.com/office/2006/metadata/properties" xmlns:xsi="http://www.w3.org/2001/XMLSchema-instance">
-  <documentManagement/>
-</p:properties>
-</file>
-
 <file path=customXml/item3.xml><?xml version="1.0" encoding="utf-8"?>
 <?mso-contentType ?>
 <FormTemplates xmlns="http://schemas.microsoft.com/sharepoint/v3/contenttype/forms">
@@ -22960,6 +22991,20 @@
 </file>
 
 <file path=customXml/itemProps1.xml><?xml version="1.0" encoding="utf-8"?>
+<ds:datastoreItem xmlns:ds="http://schemas.openxmlformats.org/officeDocument/2006/customXml" ds:itemID="{0873BDD3-AA35-4F19-A12A-C6462BECFBD1}">
+  <ds:schemaRefs>
+    <ds:schemaRef ds:uri="http://purl.org/dc/dcmitype/"/>
+    <ds:schemaRef ds:uri="http://purl.org/dc/elements/1.1/"/>
+    <ds:schemaRef ds:uri="http://schemas.microsoft.com/office/2006/documentManagement/types"/>
+    <ds:schemaRef ds:uri="http://purl.org/dc/terms/"/>
+    <ds:schemaRef ds:uri="http://www.w3.org/XML/1998/namespace"/>
+    <ds:schemaRef ds:uri="http://schemas.microsoft.com/office/2006/metadata/properties"/>
+    <ds:schemaRef ds:uri="http://schemas.openxmlformats.org/package/2006/metadata/core-properties"/>
+  </ds:schemaRefs>
+</ds:datastoreItem>
+</file>
+
+<file path=customXml/itemProps2.xml><?xml version="1.0" encoding="utf-8"?>
 <ds:datastoreItem xmlns:ds="http://schemas.openxmlformats.org/officeDocument/2006/customXml" ds:itemID="{A3332CB6-AB82-4DD3-8C89-C660A1C3944B}">
   <ds:schemaRefs>
     <ds:schemaRef ds:uri="http://schemas.microsoft.com/office/2006/metadata/contentType"/>
@@ -22974,20 +23019,6 @@
 </ds:datastoreItem>
 </file>
 
-<file path=customXml/itemProps2.xml><?xml version="1.0" encoding="utf-8"?>
-<ds:datastoreItem xmlns:ds="http://schemas.openxmlformats.org/officeDocument/2006/customXml" ds:itemID="{0873BDD3-AA35-4F19-A12A-C6462BECFBD1}">
-  <ds:schemaRefs>
-    <ds:schemaRef ds:uri="http://purl.org/dc/dcmitype/"/>
-    <ds:schemaRef ds:uri="http://purl.org/dc/elements/1.1/"/>
-    <ds:schemaRef ds:uri="http://schemas.microsoft.com/office/2006/documentManagement/types"/>
-    <ds:schemaRef ds:uri="http://purl.org/dc/terms/"/>
-    <ds:schemaRef ds:uri="http://www.w3.org/XML/1998/namespace"/>
-    <ds:schemaRef ds:uri="http://schemas.microsoft.com/office/2006/metadata/properties"/>
-    <ds:schemaRef ds:uri="http://schemas.openxmlformats.org/package/2006/metadata/core-properties"/>
-  </ds:schemaRefs>
-</ds:datastoreItem>
-</file>
-
 <file path=customXml/itemProps3.xml><?xml version="1.0" encoding="utf-8"?>
 <ds:datastoreItem xmlns:ds="http://schemas.openxmlformats.org/officeDocument/2006/customXml" ds:itemID="{86FC490B-1F77-48C5-AC70-1DD939DBDF04}">
   <ds:schemaRefs>

</xml_diff>